<commit_message>
Updated Find Seq Diagram
</commit_message>
<xml_diff>
--- a/docs/diagrams/PatientFindSequenceDiagram.pptx
+++ b/docs/diagrams/PatientFindSequenceDiagram.pptx
@@ -3450,8 +3450,8 @@
         </p:nvSpPr>
         <p:spPr>
           <a:xfrm>
-            <a:off x="6329408" y="638460"/>
-            <a:ext cx="2613024" cy="5581079"/>
+            <a:off x="6172200" y="76200"/>
+            <a:ext cx="2740845" cy="6781800"/>
           </a:xfrm>
           <a:prstGeom prst="roundRect">
             <a:avLst>
@@ -3511,8 +3511,8 @@
         </p:nvSpPr>
         <p:spPr>
           <a:xfrm>
-            <a:off x="438591" y="630800"/>
-            <a:ext cx="5863964" cy="5607714"/>
+            <a:off x="281384" y="68540"/>
+            <a:ext cx="5863964" cy="6789460"/>
           </a:xfrm>
           <a:prstGeom prst="roundRect">
             <a:avLst>
@@ -3578,7 +3578,7 @@
         </p:nvSpPr>
         <p:spPr>
           <a:xfrm>
-            <a:off x="3987034" y="3010780"/>
+            <a:off x="3829827" y="2448520"/>
             <a:ext cx="4852163" cy="1349667"/>
           </a:xfrm>
           <a:prstGeom prst="roundRect">
@@ -3637,7 +3637,7 @@
         </p:nvSpPr>
         <p:spPr>
           <a:xfrm>
-            <a:off x="4092824" y="3458481"/>
+            <a:off x="3935617" y="2896221"/>
             <a:ext cx="4648641" cy="752102"/>
           </a:xfrm>
           <a:prstGeom prst="roundRect">
@@ -3696,7 +3696,7 @@
         </p:nvSpPr>
         <p:spPr>
           <a:xfrm>
-            <a:off x="7921949" y="3850428"/>
+            <a:off x="7764742" y="3288168"/>
             <a:ext cx="124913" cy="199942"/>
           </a:xfrm>
           <a:prstGeom prst="rect">
@@ -3749,7 +3749,7 @@
         </p:nvSpPr>
         <p:spPr>
           <a:xfrm>
-            <a:off x="3993431" y="3024935"/>
+            <a:off x="3836224" y="2462675"/>
             <a:ext cx="423242" cy="261919"/>
           </a:xfrm>
           <a:custGeom>
@@ -3859,7 +3859,7 @@
         </p:nvCxnSpPr>
         <p:spPr>
           <a:xfrm>
-            <a:off x="7986539" y="3913188"/>
+            <a:off x="7829332" y="3350928"/>
             <a:ext cx="0" cy="619524"/>
           </a:xfrm>
           <a:prstGeom prst="line">
@@ -3902,7 +3902,7 @@
         </p:nvSpPr>
         <p:spPr>
           <a:xfrm>
-            <a:off x="7047877" y="2650146"/>
+            <a:off x="6890670" y="2087886"/>
             <a:ext cx="124913" cy="199942"/>
           </a:xfrm>
           <a:prstGeom prst="rect">
@@ -3949,7 +3949,7 @@
         </p:nvSpPr>
         <p:spPr>
           <a:xfrm>
-            <a:off x="853923" y="1011729"/>
+            <a:off x="696716" y="449469"/>
             <a:ext cx="1455629" cy="346760"/>
           </a:xfrm>
           <a:prstGeom prst="rect">
@@ -4018,8 +4018,8 @@
         </p:nvCxnSpPr>
         <p:spPr>
           <a:xfrm>
-            <a:off x="1581737" y="1375400"/>
-            <a:ext cx="0" cy="4844139"/>
+            <a:off x="1424530" y="813140"/>
+            <a:ext cx="0" cy="5976320"/>
           </a:xfrm>
           <a:prstGeom prst="line">
             <a:avLst/>
@@ -4055,8 +4055,8 @@
         </p:nvSpPr>
         <p:spPr>
           <a:xfrm>
-            <a:off x="1511536" y="1726094"/>
-            <a:ext cx="131666" cy="4259768"/>
+            <a:off x="1354328" y="1163834"/>
+            <a:ext cx="153227" cy="5309478"/>
           </a:xfrm>
           <a:prstGeom prst="rect">
             <a:avLst/>
@@ -4102,7 +4102,7 @@
         </p:nvSpPr>
         <p:spPr>
           <a:xfrm>
-            <a:off x="2717078" y="1011729"/>
+            <a:off x="2559871" y="449469"/>
             <a:ext cx="975176" cy="339481"/>
           </a:xfrm>
           <a:prstGeom prst="rect">
@@ -4174,8 +4174,8 @@
         </p:nvCxnSpPr>
         <p:spPr>
           <a:xfrm flipH="1">
-            <a:off x="3214207" y="1349698"/>
-            <a:ext cx="1630" cy="4869841"/>
+            <a:off x="3042555" y="787438"/>
+            <a:ext cx="16075" cy="4636164"/>
           </a:xfrm>
           <a:prstGeom prst="line">
             <a:avLst/>
@@ -4211,7 +4211,7 @@
         </p:nvSpPr>
         <p:spPr>
           <a:xfrm>
-            <a:off x="3143829" y="1807890"/>
+            <a:off x="2986622" y="1245630"/>
             <a:ext cx="120663" cy="3902175"/>
           </a:xfrm>
           <a:prstGeom prst="rect">
@@ -4264,7 +4264,7 @@
         </p:nvCxnSpPr>
         <p:spPr>
           <a:xfrm>
-            <a:off x="4731561" y="2239042"/>
+            <a:off x="4574354" y="1676782"/>
             <a:ext cx="25699" cy="3774718"/>
           </a:xfrm>
           <a:prstGeom prst="line">
@@ -4301,7 +4301,7 @@
         </p:nvSpPr>
         <p:spPr>
           <a:xfrm>
-            <a:off x="4655253" y="2028770"/>
+            <a:off x="4498046" y="1466510"/>
             <a:ext cx="124913" cy="199942"/>
           </a:xfrm>
           <a:prstGeom prst="rect">
@@ -4350,7 +4350,7 @@
         </p:nvCxnSpPr>
         <p:spPr>
           <a:xfrm>
-            <a:off x="152400" y="1726094"/>
+            <a:off x="-4807" y="1163834"/>
             <a:ext cx="1357329" cy="3688"/>
           </a:xfrm>
           <a:prstGeom prst="straightConnector1">
@@ -4386,7 +4386,7 @@
         </p:nvSpPr>
         <p:spPr>
           <a:xfrm>
-            <a:off x="8878" y="1458383"/>
+            <a:off x="-148329" y="896123"/>
             <a:ext cx="1424846" cy="215444"/>
           </a:xfrm>
           <a:prstGeom prst="rect">
@@ -4438,7 +4438,7 @@
         </p:nvCxnSpPr>
         <p:spPr>
           <a:xfrm flipV="1">
-            <a:off x="3272418" y="1929840"/>
+            <a:off x="3115211" y="1367580"/>
             <a:ext cx="820406" cy="1"/>
           </a:xfrm>
           <a:prstGeom prst="straightConnector1">
@@ -4476,7 +4476,7 @@
         </p:nvCxnSpPr>
         <p:spPr>
           <a:xfrm flipV="1">
-            <a:off x="3282186" y="2229296"/>
+            <a:off x="3124979" y="1667036"/>
             <a:ext cx="1409699" cy="2362"/>
           </a:xfrm>
           <a:prstGeom prst="straightConnector1">
@@ -4516,7 +4516,7 @@
         </p:nvCxnSpPr>
         <p:spPr>
           <a:xfrm>
-            <a:off x="4776237" y="5284523"/>
+            <a:off x="4619030" y="4722263"/>
             <a:ext cx="846733" cy="0"/>
           </a:xfrm>
           <a:prstGeom prst="straightConnector1">
@@ -4554,7 +4554,7 @@
         </p:nvSpPr>
         <p:spPr>
           <a:xfrm>
-            <a:off x="1653746" y="1581494"/>
+            <a:off x="1496539" y="1019234"/>
             <a:ext cx="1394948" cy="184666"/>
           </a:xfrm>
           <a:prstGeom prst="rect">
@@ -4606,7 +4606,7 @@
         </p:nvSpPr>
         <p:spPr>
           <a:xfrm>
-            <a:off x="3291345" y="5203079"/>
+            <a:off x="3134138" y="4640819"/>
             <a:ext cx="702471" cy="215444"/>
           </a:xfrm>
           <a:prstGeom prst="rect">
@@ -4646,7 +4646,7 @@
         </p:nvSpPr>
         <p:spPr>
           <a:xfrm>
-            <a:off x="4081833" y="1769148"/>
+            <a:off x="3924626" y="1206888"/>
             <a:ext cx="1178175" cy="321384"/>
           </a:xfrm>
           <a:prstGeom prst="rect">
@@ -4736,7 +4736,7 @@
         </p:nvCxnSpPr>
         <p:spPr>
           <a:xfrm>
-            <a:off x="1679023" y="1831701"/>
+            <a:off x="1521816" y="1269441"/>
             <a:ext cx="1460162" cy="0"/>
           </a:xfrm>
           <a:prstGeom prst="straightConnector1">
@@ -4774,7 +4774,7 @@
         </p:nvCxnSpPr>
         <p:spPr>
           <a:xfrm>
-            <a:off x="4804449" y="2585813"/>
+            <a:off x="4647242" y="2023553"/>
             <a:ext cx="1554651" cy="0"/>
           </a:xfrm>
           <a:prstGeom prst="straightConnector1">
@@ -4818,7 +4818,7 @@
         </p:nvCxnSpPr>
         <p:spPr>
           <a:xfrm>
-            <a:off x="4804449" y="4720888"/>
+            <a:off x="4647242" y="4158628"/>
             <a:ext cx="2228894" cy="0"/>
           </a:xfrm>
           <a:prstGeom prst="straightConnector1">
@@ -4864,7 +4864,7 @@
         </p:nvCxnSpPr>
         <p:spPr>
           <a:xfrm>
-            <a:off x="3281627" y="2548515"/>
+            <a:off x="3124420" y="1986255"/>
             <a:ext cx="1376374" cy="1"/>
           </a:xfrm>
           <a:prstGeom prst="straightConnector1">
@@ -4906,7 +4906,7 @@
         </p:nvSpPr>
         <p:spPr>
           <a:xfrm>
-            <a:off x="3454322" y="2314695"/>
+            <a:off x="3297115" y="1752435"/>
             <a:ext cx="914488" cy="215444"/>
           </a:xfrm>
           <a:prstGeom prst="rect">
@@ -4960,7 +4960,7 @@
         </p:nvSpPr>
         <p:spPr>
           <a:xfrm>
-            <a:off x="4667892" y="2507435"/>
+            <a:off x="4510685" y="1945175"/>
             <a:ext cx="101580" cy="2932689"/>
           </a:xfrm>
           <a:prstGeom prst="rect">
@@ -5013,7 +5013,7 @@
         </p:nvSpPr>
         <p:spPr>
           <a:xfrm>
-            <a:off x="4718214" y="3681557"/>
+            <a:off x="4561007" y="3119297"/>
             <a:ext cx="97733" cy="466524"/>
           </a:xfrm>
           <a:prstGeom prst="rect">
@@ -5066,8 +5066,8 @@
         </p:nvSpPr>
         <p:spPr>
           <a:xfrm>
-            <a:off x="4726850" y="3535462"/>
-            <a:ext cx="1544268" cy="246221"/>
+            <a:off x="4766478" y="2965368"/>
+            <a:ext cx="1544268" cy="276999"/>
           </a:xfrm>
           <a:prstGeom prst="rect">
             <a:avLst/>
@@ -5092,27 +5092,27 @@
           </a:lstStyle>
           <a:p>
             <a:r>
-              <a:rPr lang="en-US" sz="800" dirty="0" err="1"/>
+              <a:rPr lang="en-US" sz="900" dirty="0" err="1"/>
               <a:t>getKeywordsPredicate</a:t>
             </a:r>
             <a:r>
-              <a:rPr lang="en-US" sz="800" dirty="0"/>
+              <a:rPr lang="en-US" sz="900" dirty="0"/>
               <a:t> (prefix, keywords, </a:t>
             </a:r>
             <a:r>
-              <a:rPr lang="en-US" sz="800" dirty="0" err="1"/>
+              <a:rPr lang="en-US" sz="900" dirty="0" err="1"/>
               <a:t>isIgnorecase</a:t>
             </a:r>
             <a:r>
-              <a:rPr lang="en-US" sz="800" dirty="0"/>
+              <a:rPr lang="en-US" sz="900" dirty="0"/>
               <a:t>, </a:t>
             </a:r>
             <a:r>
-              <a:rPr lang="en-US" sz="800" dirty="0" err="1"/>
+              <a:rPr lang="en-US" sz="900" dirty="0" err="1"/>
               <a:t>isAnd</a:t>
             </a:r>
             <a:r>
-              <a:rPr lang="en-US" sz="800" dirty="0"/>
+              <a:rPr lang="en-US" sz="900" dirty="0"/>
               <a:t>)</a:t>
             </a:r>
           </a:p>
@@ -5132,7 +5132,7 @@
         </p:nvSpPr>
         <p:spPr>
           <a:xfrm>
-            <a:off x="6352297" y="2380801"/>
+            <a:off x="6195090" y="1818541"/>
             <a:ext cx="1482706" cy="335427"/>
           </a:xfrm>
           <a:prstGeom prst="rect">
@@ -5199,7 +5199,7 @@
         </p:nvCxnSpPr>
         <p:spPr>
           <a:xfrm>
-            <a:off x="7102672" y="2761736"/>
+            <a:off x="6945465" y="2199476"/>
             <a:ext cx="0" cy="2206420"/>
           </a:xfrm>
           <a:prstGeom prst="line">
@@ -5244,7 +5244,7 @@
         </p:nvCxnSpPr>
         <p:spPr>
           <a:xfrm>
-            <a:off x="4787743" y="2821039"/>
+            <a:off x="4630536" y="2258779"/>
             <a:ext cx="2298076" cy="893"/>
           </a:xfrm>
           <a:prstGeom prst="straightConnector1">
@@ -5288,7 +5288,7 @@
         </p:nvSpPr>
         <p:spPr>
           <a:xfrm>
-            <a:off x="5787873" y="2521956"/>
+            <a:off x="5630666" y="1959696"/>
             <a:ext cx="327334" cy="307777"/>
           </a:xfrm>
           <a:prstGeom prst="rect">
@@ -5328,7 +5328,7 @@
         </p:nvCxnSpPr>
         <p:spPr>
           <a:xfrm>
-            <a:off x="4858235" y="3846671"/>
+            <a:off x="4701028" y="3284411"/>
             <a:ext cx="2456556" cy="0"/>
           </a:xfrm>
           <a:prstGeom prst="straightConnector1">
@@ -5370,7 +5370,7 @@
         </p:nvSpPr>
         <p:spPr>
           <a:xfrm>
-            <a:off x="7329040" y="3591701"/>
+            <a:off x="7171833" y="3029441"/>
             <a:ext cx="1362109" cy="335427"/>
           </a:xfrm>
           <a:prstGeom prst="rect">
@@ -5437,7 +5437,7 @@
         </p:nvCxnSpPr>
         <p:spPr>
           <a:xfrm>
-            <a:off x="4815947" y="4022237"/>
+            <a:off x="4658740" y="3459977"/>
             <a:ext cx="3108083" cy="0"/>
           </a:xfrm>
           <a:prstGeom prst="straightConnector1">
@@ -5481,7 +5481,7 @@
         </p:nvSpPr>
         <p:spPr>
           <a:xfrm>
-            <a:off x="4369307" y="2999500"/>
+            <a:off x="4212100" y="2437240"/>
             <a:ext cx="870868" cy="246221"/>
           </a:xfrm>
           <a:prstGeom prst="rect">
@@ -5530,7 +5530,7 @@
         </p:nvCxnSpPr>
         <p:spPr>
           <a:xfrm>
-            <a:off x="4815947" y="4568862"/>
+            <a:off x="4658740" y="4006602"/>
             <a:ext cx="2217396" cy="0"/>
           </a:xfrm>
           <a:prstGeom prst="straightConnector1">
@@ -5572,7 +5572,7 @@
         </p:nvSpPr>
         <p:spPr>
           <a:xfrm>
-            <a:off x="7046368" y="4538953"/>
+            <a:off x="6889161" y="3976693"/>
             <a:ext cx="124913" cy="199942"/>
           </a:xfrm>
           <a:prstGeom prst="rect">
@@ -5625,7 +5625,7 @@
         </p:nvSpPr>
         <p:spPr>
           <a:xfrm>
-            <a:off x="5317926" y="4378824"/>
+            <a:off x="5160719" y="3816564"/>
             <a:ext cx="1601883" cy="153888"/>
           </a:xfrm>
           <a:prstGeom prst="rect">
@@ -5700,7 +5700,7 @@
         </p:nvSpPr>
         <p:spPr>
           <a:xfrm>
-            <a:off x="4776237" y="3539491"/>
+            <a:off x="4619030" y="2977231"/>
             <a:ext cx="213649" cy="229239"/>
           </a:xfrm>
           <a:custGeom>
@@ -5862,7 +5862,7 @@
         </p:nvSpPr>
         <p:spPr>
           <a:xfrm>
-            <a:off x="5560513" y="5084581"/>
+            <a:off x="5403306" y="4522321"/>
             <a:ext cx="124913" cy="199942"/>
           </a:xfrm>
           <a:prstGeom prst="rect">
@@ -5915,7 +5915,7 @@
         </p:nvSpPr>
         <p:spPr>
           <a:xfrm>
-            <a:off x="5168215" y="4819798"/>
+            <a:off x="5011008" y="4257538"/>
             <a:ext cx="934826" cy="321384"/>
           </a:xfrm>
           <a:prstGeom prst="rect">
@@ -5998,7 +5998,7 @@
         </p:nvCxnSpPr>
         <p:spPr>
           <a:xfrm>
-            <a:off x="4804449" y="4980490"/>
+            <a:off x="4647242" y="4418230"/>
             <a:ext cx="363766" cy="0"/>
           </a:xfrm>
           <a:prstGeom prst="straightConnector1">
@@ -6040,7 +6040,7 @@
         </p:nvSpPr>
         <p:spPr>
           <a:xfrm>
-            <a:off x="4812681" y="4719025"/>
+            <a:off x="4655474" y="4156765"/>
             <a:ext cx="327334" cy="307777"/>
           </a:xfrm>
           <a:prstGeom prst="rect">
@@ -6080,7 +6080,7 @@
         </p:nvCxnSpPr>
         <p:spPr>
           <a:xfrm flipV="1">
-            <a:off x="3281627" y="5436900"/>
+            <a:off x="3124420" y="4874640"/>
             <a:ext cx="1373626" cy="3224"/>
           </a:xfrm>
           <a:prstGeom prst="straightConnector1">
@@ -6126,7 +6126,7 @@
         </p:nvCxnSpPr>
         <p:spPr>
           <a:xfrm>
-            <a:off x="1661068" y="5710065"/>
+            <a:off x="1503861" y="5147805"/>
             <a:ext cx="1489860" cy="0"/>
           </a:xfrm>
           <a:prstGeom prst="straightConnector1">
@@ -6170,7 +6170,7 @@
         </p:nvSpPr>
         <p:spPr>
           <a:xfrm>
-            <a:off x="1661068" y="5476488"/>
+            <a:off x="1503861" y="4914228"/>
             <a:ext cx="702471" cy="215444"/>
           </a:xfrm>
           <a:prstGeom prst="rect">
@@ -6219,8 +6219,8 @@
         </p:nvCxnSpPr>
         <p:spPr>
           <a:xfrm>
-            <a:off x="5622970" y="5284523"/>
-            <a:ext cx="0" cy="729237"/>
+            <a:off x="5465763" y="4722263"/>
+            <a:ext cx="0" cy="1830937"/>
           </a:xfrm>
           <a:prstGeom prst="line">
             <a:avLst/>
@@ -6262,7 +6262,7 @@
         </p:nvSpPr>
         <p:spPr>
           <a:xfrm>
-            <a:off x="4092824" y="3467310"/>
+            <a:off x="3935617" y="2905050"/>
             <a:ext cx="373727" cy="157659"/>
           </a:xfrm>
           <a:custGeom>
@@ -6383,7 +6383,7 @@
         </p:nvSpPr>
         <p:spPr>
           <a:xfrm>
-            <a:off x="4032247" y="3604299"/>
+            <a:off x="3875040" y="3042039"/>
             <a:ext cx="560638" cy="369332"/>
           </a:xfrm>
           <a:prstGeom prst="rect">
@@ -6404,6 +6404,1054 @@
             <a:r>
               <a:rPr lang="en-US" sz="1000" dirty="0"/>
               <a:t>]</a:t>
+            </a:r>
+          </a:p>
+        </p:txBody>
+      </p:sp>
+      <p:cxnSp>
+        <p:nvCxnSpPr>
+          <p:cNvPr id="60" name="Straight Arrow Connector 59">
+            <a:extLst>
+              <a:ext uri="{FF2B5EF4-FFF2-40B4-BE49-F238E27FC236}">
+                <a16:creationId xmlns:a16="http://schemas.microsoft.com/office/drawing/2014/main" id="{0FDC6460-DD55-452E-B86D-84FF2FF8F283}"/>
+              </a:ext>
+            </a:extLst>
+          </p:cNvPr>
+          <p:cNvCxnSpPr>
+            <a:cxnSpLocks/>
+          </p:cNvCxnSpPr>
+          <p:nvPr/>
+        </p:nvCxnSpPr>
+        <p:spPr>
+          <a:xfrm>
+            <a:off x="1522407" y="5601661"/>
+            <a:ext cx="3880899" cy="6710"/>
+          </a:xfrm>
+          <a:prstGeom prst="straightConnector1">
+            <a:avLst/>
+          </a:prstGeom>
+          <a:ln w="19050">
+            <a:solidFill>
+              <a:srgbClr val="0070C0"/>
+            </a:solidFill>
+            <a:tailEnd type="arrow"/>
+          </a:ln>
+        </p:spPr>
+        <p:style>
+          <a:lnRef idx="1">
+            <a:schemeClr val="accent1"/>
+          </a:lnRef>
+          <a:fillRef idx="0">
+            <a:schemeClr val="accent1"/>
+          </a:fillRef>
+          <a:effectRef idx="0">
+            <a:schemeClr val="accent1"/>
+          </a:effectRef>
+          <a:fontRef idx="minor">
+            <a:schemeClr val="tx1"/>
+          </a:fontRef>
+        </p:style>
+      </p:cxnSp>
+      <p:sp>
+        <p:nvSpPr>
+          <p:cNvPr id="61" name="TextBox 60">
+            <a:extLst>
+              <a:ext uri="{FF2B5EF4-FFF2-40B4-BE49-F238E27FC236}">
+                <a16:creationId xmlns:a16="http://schemas.microsoft.com/office/drawing/2014/main" id="{58197AFA-4E44-46BD-8B55-179CB656553C}"/>
+              </a:ext>
+            </a:extLst>
+          </p:cNvPr>
+          <p:cNvSpPr txBox="1"/>
+          <p:nvPr/>
+        </p:nvSpPr>
+        <p:spPr>
+          <a:xfrm>
+            <a:off x="2914415" y="5359872"/>
+            <a:ext cx="1048148" cy="215444"/>
+          </a:xfrm>
+          <a:prstGeom prst="rect">
+            <a:avLst/>
+          </a:prstGeom>
+          <a:noFill/>
+        </p:spPr>
+        <p:txBody>
+          <a:bodyPr wrap="square" lIns="0" tIns="0" rIns="0" bIns="0" rtlCol="0">
+            <a:spAutoFit/>
+          </a:bodyPr>
+          <a:lstStyle>
+            <a:defPPr>
+              <a:defRPr lang="en-US"/>
+            </a:defPPr>
+            <a:lvl1pPr algn="r">
+              <a:defRPr sz="1400">
+                <a:solidFill>
+                  <a:srgbClr val="0070C0"/>
+                </a:solidFill>
+              </a:defRPr>
+            </a:lvl1pPr>
+          </a:lstStyle>
+          <a:p>
+            <a:r>
+              <a:rPr lang="en-US" dirty="0"/>
+              <a:t>execute()</a:t>
+            </a:r>
+          </a:p>
+        </p:txBody>
+      </p:sp>
+      <p:sp>
+        <p:nvSpPr>
+          <p:cNvPr id="58" name="Rectangle 57">
+            <a:extLst>
+              <a:ext uri="{FF2B5EF4-FFF2-40B4-BE49-F238E27FC236}">
+                <a16:creationId xmlns:a16="http://schemas.microsoft.com/office/drawing/2014/main" id="{E0E3BDC4-82C4-4140-AFE4-4986162BA40E}"/>
+              </a:ext>
+            </a:extLst>
+          </p:cNvPr>
+          <p:cNvSpPr/>
+          <p:nvPr/>
+        </p:nvSpPr>
+        <p:spPr>
+          <a:xfrm>
+            <a:off x="5403306" y="5575167"/>
+            <a:ext cx="124913" cy="813234"/>
+          </a:xfrm>
+          <a:prstGeom prst="rect">
+            <a:avLst/>
+          </a:prstGeom>
+          <a:solidFill>
+            <a:srgbClr val="0070C0"/>
+          </a:solidFill>
+          <a:ln>
+            <a:solidFill>
+              <a:srgbClr val="0070C0"/>
+            </a:solidFill>
+          </a:ln>
+          <a:effectLst/>
+        </p:spPr>
+        <p:style>
+          <a:lnRef idx="1">
+            <a:schemeClr val="accent3"/>
+          </a:lnRef>
+          <a:fillRef idx="2">
+            <a:schemeClr val="accent3"/>
+          </a:fillRef>
+          <a:effectRef idx="1">
+            <a:schemeClr val="accent3"/>
+          </a:effectRef>
+          <a:fontRef idx="minor">
+            <a:schemeClr val="dk1"/>
+          </a:fontRef>
+        </p:style>
+        <p:txBody>
+          <a:bodyPr rtlCol="0" anchor="ctr"/>
+          <a:lstStyle/>
+          <a:p>
+            <a:pPr algn="ctr"/>
+            <a:endParaRPr lang="en-SG" sz="1400"/>
+          </a:p>
+        </p:txBody>
+      </p:sp>
+      <p:sp>
+        <p:nvSpPr>
+          <p:cNvPr id="65" name="Rectangle 62">
+            <a:extLst>
+              <a:ext uri="{FF2B5EF4-FFF2-40B4-BE49-F238E27FC236}">
+                <a16:creationId xmlns:a16="http://schemas.microsoft.com/office/drawing/2014/main" id="{E0ABE51F-A33F-4484-8D1F-1A03F806F938}"/>
+              </a:ext>
+            </a:extLst>
+          </p:cNvPr>
+          <p:cNvSpPr/>
+          <p:nvPr/>
+        </p:nvSpPr>
+        <p:spPr>
+          <a:xfrm>
+            <a:off x="6502365" y="5083390"/>
+            <a:ext cx="663734" cy="155805"/>
+          </a:xfrm>
+          <a:prstGeom prst="rect">
+            <a:avLst/>
+          </a:prstGeom>
+          <a:solidFill>
+            <a:srgbClr val="7030A0"/>
+          </a:solidFill>
+          <a:ln w="19050">
+            <a:solidFill>
+              <a:srgbClr val="7030A0"/>
+            </a:solidFill>
+          </a:ln>
+          <a:effectLst/>
+        </p:spPr>
+        <p:style>
+          <a:lnRef idx="1">
+            <a:schemeClr val="accent2"/>
+          </a:lnRef>
+          <a:fillRef idx="2">
+            <a:schemeClr val="accent2"/>
+          </a:fillRef>
+          <a:effectRef idx="1">
+            <a:schemeClr val="accent2"/>
+          </a:effectRef>
+          <a:fontRef idx="minor">
+            <a:schemeClr val="dk1"/>
+          </a:fontRef>
+        </p:style>
+        <p:txBody>
+          <a:bodyPr rtlCol="0" anchor="ctr"/>
+          <a:lstStyle/>
+          <a:p>
+            <a:pPr algn="ctr"/>
+            <a:r>
+              <a:rPr lang="en-US" sz="1200" dirty="0">
+                <a:solidFill>
+                  <a:schemeClr val="bg1"/>
+                </a:solidFill>
+              </a:rPr>
+              <a:t>: Model</a:t>
+            </a:r>
+            <a:endParaRPr lang="en-SG" sz="1200" dirty="0">
+              <a:solidFill>
+                <a:schemeClr val="bg1"/>
+              </a:solidFill>
+            </a:endParaRPr>
+          </a:p>
+        </p:txBody>
+      </p:sp>
+      <p:cxnSp>
+        <p:nvCxnSpPr>
+          <p:cNvPr id="66" name="Straight Connector 65">
+            <a:extLst>
+              <a:ext uri="{FF2B5EF4-FFF2-40B4-BE49-F238E27FC236}">
+                <a16:creationId xmlns:a16="http://schemas.microsoft.com/office/drawing/2014/main" id="{A5443CA6-FF83-479E-A7EA-B958BBBA9505}"/>
+              </a:ext>
+            </a:extLst>
+          </p:cNvPr>
+          <p:cNvCxnSpPr>
+            <a:cxnSpLocks/>
+          </p:cNvCxnSpPr>
+          <p:nvPr/>
+        </p:nvCxnSpPr>
+        <p:spPr>
+          <a:xfrm>
+            <a:off x="6816236" y="5277892"/>
+            <a:ext cx="24286" cy="1305902"/>
+          </a:xfrm>
+          <a:prstGeom prst="line">
+            <a:avLst/>
+          </a:prstGeom>
+          <a:ln w="19050">
+            <a:solidFill>
+              <a:srgbClr val="7030A0"/>
+            </a:solidFill>
+            <a:prstDash val="sysDash"/>
+          </a:ln>
+          <a:effectLst/>
+        </p:spPr>
+        <p:style>
+          <a:lnRef idx="1">
+            <a:schemeClr val="accent1"/>
+          </a:lnRef>
+          <a:fillRef idx="2">
+            <a:schemeClr val="accent1"/>
+          </a:fillRef>
+          <a:effectRef idx="1">
+            <a:schemeClr val="accent1"/>
+          </a:effectRef>
+          <a:fontRef idx="minor">
+            <a:schemeClr val="dk1"/>
+          </a:fontRef>
+        </p:style>
+      </p:cxnSp>
+      <p:sp>
+        <p:nvSpPr>
+          <p:cNvPr id="68" name="Rectangle 67">
+            <a:extLst>
+              <a:ext uri="{FF2B5EF4-FFF2-40B4-BE49-F238E27FC236}">
+                <a16:creationId xmlns:a16="http://schemas.microsoft.com/office/drawing/2014/main" id="{547A2D5C-C30D-4BBC-96FC-FA24D6F28317}"/>
+              </a:ext>
+            </a:extLst>
+          </p:cNvPr>
+          <p:cNvSpPr/>
+          <p:nvPr/>
+        </p:nvSpPr>
+        <p:spPr>
+          <a:xfrm>
+            <a:off x="6781801" y="5666812"/>
+            <a:ext cx="93762" cy="575849"/>
+          </a:xfrm>
+          <a:prstGeom prst="rect">
+            <a:avLst/>
+          </a:prstGeom>
+          <a:solidFill>
+            <a:srgbClr val="7030A0"/>
+          </a:solidFill>
+          <a:ln>
+            <a:solidFill>
+              <a:srgbClr val="7030A0"/>
+            </a:solidFill>
+          </a:ln>
+          <a:effectLst/>
+        </p:spPr>
+        <p:style>
+          <a:lnRef idx="1">
+            <a:schemeClr val="accent3"/>
+          </a:lnRef>
+          <a:fillRef idx="2">
+            <a:schemeClr val="accent3"/>
+          </a:fillRef>
+          <a:effectRef idx="1">
+            <a:schemeClr val="accent3"/>
+          </a:effectRef>
+          <a:fontRef idx="minor">
+            <a:schemeClr val="dk1"/>
+          </a:fontRef>
+        </p:style>
+        <p:txBody>
+          <a:bodyPr rtlCol="0" anchor="ctr"/>
+          <a:lstStyle/>
+          <a:p>
+            <a:pPr algn="ctr"/>
+            <a:endParaRPr lang="en-SG" sz="1400"/>
+          </a:p>
+        </p:txBody>
+      </p:sp>
+      <p:cxnSp>
+        <p:nvCxnSpPr>
+          <p:cNvPr id="69" name="Straight Connector 68">
+            <a:extLst>
+              <a:ext uri="{FF2B5EF4-FFF2-40B4-BE49-F238E27FC236}">
+                <a16:creationId xmlns:a16="http://schemas.microsoft.com/office/drawing/2014/main" id="{5AAB9EBE-AB78-4275-B1A5-58EA8CAD5427}"/>
+              </a:ext>
+            </a:extLst>
+          </p:cNvPr>
+          <p:cNvCxnSpPr>
+            <a:cxnSpLocks/>
+          </p:cNvCxnSpPr>
+          <p:nvPr/>
+        </p:nvCxnSpPr>
+        <p:spPr>
+          <a:xfrm>
+            <a:off x="8399771" y="5575167"/>
+            <a:ext cx="0" cy="833364"/>
+          </a:xfrm>
+          <a:prstGeom prst="line">
+            <a:avLst/>
+          </a:prstGeom>
+          <a:ln w="19050">
+            <a:solidFill>
+              <a:srgbClr val="7030A0"/>
+            </a:solidFill>
+            <a:prstDash val="sysDash"/>
+          </a:ln>
+          <a:effectLst/>
+        </p:spPr>
+        <p:style>
+          <a:lnRef idx="1">
+            <a:schemeClr val="accent1"/>
+          </a:lnRef>
+          <a:fillRef idx="2">
+            <a:schemeClr val="accent1"/>
+          </a:fillRef>
+          <a:effectRef idx="1">
+            <a:schemeClr val="accent1"/>
+          </a:effectRef>
+          <a:fontRef idx="minor">
+            <a:schemeClr val="dk1"/>
+          </a:fontRef>
+        </p:style>
+      </p:cxnSp>
+      <p:cxnSp>
+        <p:nvCxnSpPr>
+          <p:cNvPr id="70" name="Straight Arrow Connector 69">
+            <a:extLst>
+              <a:ext uri="{FF2B5EF4-FFF2-40B4-BE49-F238E27FC236}">
+                <a16:creationId xmlns:a16="http://schemas.microsoft.com/office/drawing/2014/main" id="{F0AA5004-4025-49EA-8FAD-916BF4BB6F29}"/>
+              </a:ext>
+            </a:extLst>
+          </p:cNvPr>
+          <p:cNvCxnSpPr>
+            <a:cxnSpLocks/>
+          </p:cNvCxnSpPr>
+          <p:nvPr/>
+        </p:nvCxnSpPr>
+        <p:spPr>
+          <a:xfrm>
+            <a:off x="6866004" y="5893408"/>
+            <a:ext cx="1470216" cy="0"/>
+          </a:xfrm>
+          <a:prstGeom prst="straightConnector1">
+            <a:avLst/>
+          </a:prstGeom>
+          <a:ln w="19050">
+            <a:solidFill>
+              <a:srgbClr val="7030A0"/>
+            </a:solidFill>
+            <a:tailEnd type="arrow"/>
+          </a:ln>
+        </p:spPr>
+        <p:style>
+          <a:lnRef idx="1">
+            <a:schemeClr val="accent1"/>
+          </a:lnRef>
+          <a:fillRef idx="0">
+            <a:schemeClr val="accent1"/>
+          </a:fillRef>
+          <a:effectRef idx="0">
+            <a:schemeClr val="accent1"/>
+          </a:effectRef>
+          <a:fontRef idx="minor">
+            <a:schemeClr val="tx1"/>
+          </a:fontRef>
+        </p:style>
+      </p:cxnSp>
+      <p:cxnSp>
+        <p:nvCxnSpPr>
+          <p:cNvPr id="71" name="Straight Arrow Connector 70">
+            <a:extLst>
+              <a:ext uri="{FF2B5EF4-FFF2-40B4-BE49-F238E27FC236}">
+                <a16:creationId xmlns:a16="http://schemas.microsoft.com/office/drawing/2014/main" id="{A9E71E9C-B498-455F-9937-4B976071975C}"/>
+              </a:ext>
+            </a:extLst>
+          </p:cNvPr>
+          <p:cNvCxnSpPr>
+            <a:cxnSpLocks/>
+          </p:cNvCxnSpPr>
+          <p:nvPr/>
+        </p:nvCxnSpPr>
+        <p:spPr>
+          <a:xfrm flipV="1">
+            <a:off x="6875567" y="6106262"/>
+            <a:ext cx="1470216" cy="6325"/>
+          </a:xfrm>
+          <a:prstGeom prst="straightConnector1">
+            <a:avLst/>
+          </a:prstGeom>
+          <a:ln w="19050">
+            <a:solidFill>
+              <a:srgbClr val="7030A0"/>
+            </a:solidFill>
+            <a:prstDash val="sysDash"/>
+            <a:headEnd type="arrow" w="med" len="med"/>
+            <a:tailEnd type="none" w="med" len="med"/>
+          </a:ln>
+        </p:spPr>
+        <p:style>
+          <a:lnRef idx="1">
+            <a:schemeClr val="accent1"/>
+          </a:lnRef>
+          <a:fillRef idx="0">
+            <a:schemeClr val="accent1"/>
+          </a:fillRef>
+          <a:effectRef idx="0">
+            <a:schemeClr val="accent1"/>
+          </a:effectRef>
+          <a:fontRef idx="minor">
+            <a:schemeClr val="tx1"/>
+          </a:fontRef>
+        </p:style>
+      </p:cxnSp>
+      <p:sp>
+        <p:nvSpPr>
+          <p:cNvPr id="72" name="Rectangle 62">
+            <a:extLst>
+              <a:ext uri="{FF2B5EF4-FFF2-40B4-BE49-F238E27FC236}">
+                <a16:creationId xmlns:a16="http://schemas.microsoft.com/office/drawing/2014/main" id="{75CFFF6B-5049-4DB5-8A11-3F1D337E7FD9}"/>
+              </a:ext>
+            </a:extLst>
+          </p:cNvPr>
+          <p:cNvSpPr/>
+          <p:nvPr/>
+        </p:nvSpPr>
+        <p:spPr>
+          <a:xfrm>
+            <a:off x="7927781" y="5340234"/>
+            <a:ext cx="909724" cy="229260"/>
+          </a:xfrm>
+          <a:prstGeom prst="rect">
+            <a:avLst/>
+          </a:prstGeom>
+          <a:solidFill>
+            <a:srgbClr val="7030A0"/>
+          </a:solidFill>
+          <a:ln w="19050">
+            <a:solidFill>
+              <a:srgbClr val="7030A0"/>
+            </a:solidFill>
+          </a:ln>
+          <a:effectLst/>
+        </p:spPr>
+        <p:style>
+          <a:lnRef idx="1">
+            <a:schemeClr val="accent2"/>
+          </a:lnRef>
+          <a:fillRef idx="2">
+            <a:schemeClr val="accent2"/>
+          </a:fillRef>
+          <a:effectRef idx="1">
+            <a:schemeClr val="accent2"/>
+          </a:effectRef>
+          <a:fontRef idx="minor">
+            <a:schemeClr val="dk1"/>
+          </a:fontRef>
+        </p:style>
+        <p:txBody>
+          <a:bodyPr rtlCol="0" anchor="ctr"/>
+          <a:lstStyle/>
+          <a:p>
+            <a:pPr algn="ctr"/>
+            <a:r>
+              <a:rPr lang="en-US" sz="1200" dirty="0">
+                <a:solidFill>
+                  <a:schemeClr val="bg1"/>
+                </a:solidFill>
+              </a:rPr>
+              <a:t>:</a:t>
+            </a:r>
+            <a:r>
+              <a:rPr lang="en-US" sz="1200" dirty="0" err="1">
+                <a:solidFill>
+                  <a:schemeClr val="bg1"/>
+                </a:solidFill>
+              </a:rPr>
+              <a:t>FilteredList</a:t>
+            </a:r>
+            <a:endParaRPr lang="en-SG" sz="1200" dirty="0">
+              <a:solidFill>
+                <a:schemeClr val="bg1"/>
+              </a:solidFill>
+            </a:endParaRPr>
+          </a:p>
+        </p:txBody>
+      </p:sp>
+      <p:sp>
+        <p:nvSpPr>
+          <p:cNvPr id="73" name="TextBox 72">
+            <a:extLst>
+              <a:ext uri="{FF2B5EF4-FFF2-40B4-BE49-F238E27FC236}">
+                <a16:creationId xmlns:a16="http://schemas.microsoft.com/office/drawing/2014/main" id="{AB1A5CCA-320A-46D5-9B7E-99F1E6D35F34}"/>
+              </a:ext>
+            </a:extLst>
+          </p:cNvPr>
+          <p:cNvSpPr txBox="1"/>
+          <p:nvPr/>
+        </p:nvSpPr>
+        <p:spPr>
+          <a:xfrm>
+            <a:off x="6857262" y="5657492"/>
+            <a:ext cx="1531243" cy="184666"/>
+          </a:xfrm>
+          <a:prstGeom prst="rect">
+            <a:avLst/>
+          </a:prstGeom>
+          <a:noFill/>
+        </p:spPr>
+        <p:txBody>
+          <a:bodyPr wrap="square" lIns="0" tIns="0" rIns="0" bIns="0" rtlCol="0">
+            <a:spAutoFit/>
+          </a:bodyPr>
+          <a:lstStyle>
+            <a:defPPr>
+              <a:defRPr lang="en-US"/>
+            </a:defPPr>
+            <a:lvl1pPr algn="r">
+              <a:defRPr sz="1400">
+                <a:solidFill>
+                  <a:srgbClr val="0070C0"/>
+                </a:solidFill>
+              </a:defRPr>
+            </a:lvl1pPr>
+          </a:lstStyle>
+          <a:p>
+            <a:r>
+              <a:rPr lang="en-US" sz="1200" dirty="0" err="1">
+                <a:solidFill>
+                  <a:schemeClr val="accent4">
+                    <a:lumMod val="75000"/>
+                  </a:schemeClr>
+                </a:solidFill>
+              </a:rPr>
+              <a:t>setPredicate</a:t>
+            </a:r>
+            <a:r>
+              <a:rPr lang="en-US" sz="1200" dirty="0">
+                <a:solidFill>
+                  <a:schemeClr val="accent4">
+                    <a:lumMod val="75000"/>
+                  </a:schemeClr>
+                </a:solidFill>
+              </a:rPr>
+              <a:t>(predicate)</a:t>
+            </a:r>
+            <a:endParaRPr lang="en-US" sz="1200" dirty="0"/>
+          </a:p>
+        </p:txBody>
+      </p:sp>
+      <p:cxnSp>
+        <p:nvCxnSpPr>
+          <p:cNvPr id="11" name="Straight Arrow Connector 10">
+            <a:extLst>
+              <a:ext uri="{FF2B5EF4-FFF2-40B4-BE49-F238E27FC236}">
+                <a16:creationId xmlns:a16="http://schemas.microsoft.com/office/drawing/2014/main" id="{41682926-C373-45B6-A216-8EC655667254}"/>
+              </a:ext>
+            </a:extLst>
+          </p:cNvPr>
+          <p:cNvCxnSpPr/>
+          <p:nvPr/>
+        </p:nvCxnSpPr>
+        <p:spPr>
+          <a:xfrm flipH="1">
+            <a:off x="4648201" y="3192920"/>
+            <a:ext cx="102392" cy="7480"/>
+          </a:xfrm>
+          <a:prstGeom prst="straightConnector1">
+            <a:avLst/>
+          </a:prstGeom>
+          <a:ln>
+            <a:solidFill>
+              <a:schemeClr val="tx1"/>
+            </a:solidFill>
+            <a:tailEnd type="triangle"/>
+          </a:ln>
+        </p:spPr>
+        <p:style>
+          <a:lnRef idx="1">
+            <a:schemeClr val="accent1"/>
+          </a:lnRef>
+          <a:fillRef idx="0">
+            <a:schemeClr val="accent1"/>
+          </a:fillRef>
+          <a:effectRef idx="0">
+            <a:schemeClr val="accent1"/>
+          </a:effectRef>
+          <a:fontRef idx="minor">
+            <a:schemeClr val="tx1"/>
+          </a:fontRef>
+        </p:style>
+      </p:cxnSp>
+      <p:sp>
+        <p:nvSpPr>
+          <p:cNvPr id="79" name="TextBox 78">
+            <a:extLst>
+              <a:ext uri="{FF2B5EF4-FFF2-40B4-BE49-F238E27FC236}">
+                <a16:creationId xmlns:a16="http://schemas.microsoft.com/office/drawing/2014/main" id="{93C52D1D-A9D2-4ABC-88A6-BF4A4BD4DC0B}"/>
+              </a:ext>
+            </a:extLst>
+          </p:cNvPr>
+          <p:cNvSpPr txBox="1"/>
+          <p:nvPr/>
+        </p:nvSpPr>
+        <p:spPr>
+          <a:xfrm>
+            <a:off x="5489736" y="5351020"/>
+            <a:ext cx="1122761" cy="307777"/>
+          </a:xfrm>
+          <a:prstGeom prst="rect">
+            <a:avLst/>
+          </a:prstGeom>
+          <a:noFill/>
+        </p:spPr>
+        <p:txBody>
+          <a:bodyPr wrap="square" lIns="0" tIns="0" rIns="0" bIns="0" rtlCol="0">
+            <a:spAutoFit/>
+          </a:bodyPr>
+          <a:lstStyle>
+            <a:defPPr>
+              <a:defRPr lang="en-US"/>
+            </a:defPPr>
+            <a:lvl1pPr algn="r">
+              <a:defRPr sz="1400">
+                <a:solidFill>
+                  <a:srgbClr val="0070C0"/>
+                </a:solidFill>
+              </a:defRPr>
+            </a:lvl1pPr>
+          </a:lstStyle>
+          <a:p>
+            <a:r>
+              <a:rPr lang="en-US" sz="1000" dirty="0" err="1">
+                <a:solidFill>
+                  <a:schemeClr val="accent4">
+                    <a:lumMod val="75000"/>
+                  </a:schemeClr>
+                </a:solidFill>
+              </a:rPr>
+              <a:t>updateFilteredPersonList</a:t>
+            </a:r>
+            <a:r>
+              <a:rPr lang="en-US" sz="1000" dirty="0">
+                <a:solidFill>
+                  <a:schemeClr val="accent4">
+                    <a:lumMod val="75000"/>
+                  </a:schemeClr>
+                </a:solidFill>
+              </a:rPr>
+              <a:t>(predicate)</a:t>
+            </a:r>
+            <a:endParaRPr lang="en-US" sz="1000" dirty="0"/>
+          </a:p>
+        </p:txBody>
+      </p:sp>
+      <p:cxnSp>
+        <p:nvCxnSpPr>
+          <p:cNvPr id="82" name="Straight Arrow Connector 81">
+            <a:extLst>
+              <a:ext uri="{FF2B5EF4-FFF2-40B4-BE49-F238E27FC236}">
+                <a16:creationId xmlns:a16="http://schemas.microsoft.com/office/drawing/2014/main" id="{56EBAF92-F621-4C8A-9BF8-3C860C3CAA2C}"/>
+              </a:ext>
+            </a:extLst>
+          </p:cNvPr>
+          <p:cNvCxnSpPr>
+            <a:cxnSpLocks/>
+          </p:cNvCxnSpPr>
+          <p:nvPr/>
+        </p:nvCxnSpPr>
+        <p:spPr>
+          <a:xfrm>
+            <a:off x="5534848" y="5679191"/>
+            <a:ext cx="1210345" cy="0"/>
+          </a:xfrm>
+          <a:prstGeom prst="straightConnector1">
+            <a:avLst/>
+          </a:prstGeom>
+          <a:ln w="19050">
+            <a:solidFill>
+              <a:srgbClr val="0070C0"/>
+            </a:solidFill>
+            <a:tailEnd type="arrow"/>
+          </a:ln>
+        </p:spPr>
+        <p:style>
+          <a:lnRef idx="1">
+            <a:schemeClr val="accent1"/>
+          </a:lnRef>
+          <a:fillRef idx="0">
+            <a:schemeClr val="accent1"/>
+          </a:fillRef>
+          <a:effectRef idx="0">
+            <a:schemeClr val="accent1"/>
+          </a:effectRef>
+          <a:fontRef idx="minor">
+            <a:schemeClr val="tx1"/>
+          </a:fontRef>
+        </p:style>
+      </p:cxnSp>
+      <p:sp>
+        <p:nvSpPr>
+          <p:cNvPr id="64" name="Rectangle 63">
+            <a:extLst>
+              <a:ext uri="{FF2B5EF4-FFF2-40B4-BE49-F238E27FC236}">
+                <a16:creationId xmlns:a16="http://schemas.microsoft.com/office/drawing/2014/main" id="{CD33CCD8-1992-432E-9DAF-B8EE3B5DE6AB}"/>
+              </a:ext>
+            </a:extLst>
+          </p:cNvPr>
+          <p:cNvSpPr/>
+          <p:nvPr/>
+        </p:nvSpPr>
+        <p:spPr>
+          <a:xfrm>
+            <a:off x="8334806" y="5875161"/>
+            <a:ext cx="118626" cy="239625"/>
+          </a:xfrm>
+          <a:prstGeom prst="rect">
+            <a:avLst/>
+          </a:prstGeom>
+          <a:solidFill>
+            <a:srgbClr val="7030A0"/>
+          </a:solidFill>
+          <a:ln>
+            <a:solidFill>
+              <a:srgbClr val="7030A0"/>
+            </a:solidFill>
+          </a:ln>
+          <a:effectLst/>
+        </p:spPr>
+        <p:style>
+          <a:lnRef idx="1">
+            <a:schemeClr val="accent3"/>
+          </a:lnRef>
+          <a:fillRef idx="2">
+            <a:schemeClr val="accent3"/>
+          </a:fillRef>
+          <a:effectRef idx="1">
+            <a:schemeClr val="accent3"/>
+          </a:effectRef>
+          <a:fontRef idx="minor">
+            <a:schemeClr val="dk1"/>
+          </a:fontRef>
+        </p:style>
+        <p:txBody>
+          <a:bodyPr rtlCol="0" anchor="ctr"/>
+          <a:lstStyle/>
+          <a:p>
+            <a:pPr algn="ctr"/>
+            <a:endParaRPr lang="en-SG" sz="1400"/>
+          </a:p>
+        </p:txBody>
+      </p:sp>
+      <p:cxnSp>
+        <p:nvCxnSpPr>
+          <p:cNvPr id="84" name="Straight Arrow Connector 83">
+            <a:extLst>
+              <a:ext uri="{FF2B5EF4-FFF2-40B4-BE49-F238E27FC236}">
+                <a16:creationId xmlns:a16="http://schemas.microsoft.com/office/drawing/2014/main" id="{F1A92A65-0243-46D3-82DD-75E952A57BFB}"/>
+              </a:ext>
+            </a:extLst>
+          </p:cNvPr>
+          <p:cNvCxnSpPr>
+            <a:cxnSpLocks/>
+          </p:cNvCxnSpPr>
+          <p:nvPr/>
+        </p:nvCxnSpPr>
+        <p:spPr>
+          <a:xfrm>
+            <a:off x="5544466" y="6239915"/>
+            <a:ext cx="1296056" cy="0"/>
+          </a:xfrm>
+          <a:prstGeom prst="straightConnector1">
+            <a:avLst/>
+          </a:prstGeom>
+          <a:ln w="19050">
+            <a:solidFill>
+              <a:srgbClr val="7030A0"/>
+            </a:solidFill>
+            <a:prstDash val="sysDash"/>
+            <a:headEnd type="arrow" w="med" len="med"/>
+            <a:tailEnd type="none" w="med" len="med"/>
+          </a:ln>
+        </p:spPr>
+        <p:style>
+          <a:lnRef idx="1">
+            <a:schemeClr val="accent1"/>
+          </a:lnRef>
+          <a:fillRef idx="0">
+            <a:schemeClr val="accent1"/>
+          </a:fillRef>
+          <a:effectRef idx="0">
+            <a:schemeClr val="accent1"/>
+          </a:effectRef>
+          <a:fontRef idx="minor">
+            <a:schemeClr val="tx1"/>
+          </a:fontRef>
+        </p:style>
+      </p:cxnSp>
+      <p:sp>
+        <p:nvSpPr>
+          <p:cNvPr id="86" name="TextBox 85">
+            <a:extLst>
+              <a:ext uri="{FF2B5EF4-FFF2-40B4-BE49-F238E27FC236}">
+                <a16:creationId xmlns:a16="http://schemas.microsoft.com/office/drawing/2014/main" id="{A9B014AC-EEC5-4BF1-AD9F-0BF9C6496BD1}"/>
+              </a:ext>
+            </a:extLst>
+          </p:cNvPr>
+          <p:cNvSpPr txBox="1"/>
+          <p:nvPr/>
+        </p:nvSpPr>
+        <p:spPr>
+          <a:xfrm>
+            <a:off x="3105228" y="6118935"/>
+            <a:ext cx="621216" cy="215444"/>
+          </a:xfrm>
+          <a:prstGeom prst="rect">
+            <a:avLst/>
+          </a:prstGeom>
+          <a:noFill/>
+        </p:spPr>
+        <p:txBody>
+          <a:bodyPr wrap="square" lIns="0" tIns="0" rIns="0" bIns="0" rtlCol="0">
+            <a:spAutoFit/>
+          </a:bodyPr>
+          <a:lstStyle>
+            <a:defPPr>
+              <a:defRPr lang="en-US"/>
+            </a:defPPr>
+            <a:lvl1pPr algn="r">
+              <a:defRPr sz="1400">
+                <a:solidFill>
+                  <a:srgbClr val="0070C0"/>
+                </a:solidFill>
+              </a:defRPr>
+            </a:lvl1pPr>
+          </a:lstStyle>
+          <a:p>
+            <a:r>
+              <a:rPr lang="en-US" dirty="0"/>
+              <a:t>result</a:t>
+            </a:r>
+          </a:p>
+        </p:txBody>
+      </p:sp>
+      <p:cxnSp>
+        <p:nvCxnSpPr>
+          <p:cNvPr id="88" name="Straight Arrow Connector 87">
+            <a:extLst>
+              <a:ext uri="{FF2B5EF4-FFF2-40B4-BE49-F238E27FC236}">
+                <a16:creationId xmlns:a16="http://schemas.microsoft.com/office/drawing/2014/main" id="{67375824-6A63-4529-A49B-B315A630FFFE}"/>
+              </a:ext>
+            </a:extLst>
+          </p:cNvPr>
+          <p:cNvCxnSpPr>
+            <a:cxnSpLocks/>
+          </p:cNvCxnSpPr>
+          <p:nvPr/>
+        </p:nvCxnSpPr>
+        <p:spPr>
+          <a:xfrm>
+            <a:off x="1524471" y="6364321"/>
+            <a:ext cx="3831517" cy="0"/>
+          </a:xfrm>
+          <a:prstGeom prst="straightConnector1">
+            <a:avLst/>
+          </a:prstGeom>
+          <a:ln w="19050">
+            <a:solidFill>
+              <a:srgbClr val="0070C0"/>
+            </a:solidFill>
+            <a:prstDash val="sysDash"/>
+            <a:headEnd type="arrow" w="med" len="med"/>
+            <a:tailEnd type="none" w="med" len="med"/>
+          </a:ln>
+        </p:spPr>
+        <p:style>
+          <a:lnRef idx="1">
+            <a:schemeClr val="accent1"/>
+          </a:lnRef>
+          <a:fillRef idx="0">
+            <a:schemeClr val="accent1"/>
+          </a:fillRef>
+          <a:effectRef idx="0">
+            <a:schemeClr val="accent1"/>
+          </a:effectRef>
+          <a:fontRef idx="minor">
+            <a:schemeClr val="tx1"/>
+          </a:fontRef>
+        </p:style>
+      </p:cxnSp>
+      <p:sp>
+        <p:nvSpPr>
+          <p:cNvPr id="89" name="TextBox 88">
+            <a:extLst>
+              <a:ext uri="{FF2B5EF4-FFF2-40B4-BE49-F238E27FC236}">
+                <a16:creationId xmlns:a16="http://schemas.microsoft.com/office/drawing/2014/main" id="{EEB08BBA-57DC-4738-8D31-B1867508B3D0}"/>
+              </a:ext>
+            </a:extLst>
+          </p:cNvPr>
+          <p:cNvSpPr txBox="1"/>
+          <p:nvPr/>
+        </p:nvSpPr>
+        <p:spPr>
+          <a:xfrm>
+            <a:off x="504908" y="6239915"/>
+            <a:ext cx="621216" cy="215444"/>
+          </a:xfrm>
+          <a:prstGeom prst="rect">
+            <a:avLst/>
+          </a:prstGeom>
+          <a:noFill/>
+        </p:spPr>
+        <p:txBody>
+          <a:bodyPr wrap="square" lIns="0" tIns="0" rIns="0" bIns="0" rtlCol="0">
+            <a:spAutoFit/>
+          </a:bodyPr>
+          <a:lstStyle>
+            <a:defPPr>
+              <a:defRPr lang="en-US"/>
+            </a:defPPr>
+            <a:lvl1pPr algn="r">
+              <a:defRPr sz="1400">
+                <a:solidFill>
+                  <a:srgbClr val="0070C0"/>
+                </a:solidFill>
+              </a:defRPr>
+            </a:lvl1pPr>
+          </a:lstStyle>
+          <a:p>
+            <a:r>
+              <a:rPr lang="en-US" dirty="0"/>
+              <a:t>result</a:t>
+            </a:r>
+          </a:p>
+        </p:txBody>
+      </p:sp>
+      <p:cxnSp>
+        <p:nvCxnSpPr>
+          <p:cNvPr id="90" name="Straight Arrow Connector 89">
+            <a:extLst>
+              <a:ext uri="{FF2B5EF4-FFF2-40B4-BE49-F238E27FC236}">
+                <a16:creationId xmlns:a16="http://schemas.microsoft.com/office/drawing/2014/main" id="{771AEA9E-DED3-4A76-9FE5-A09D67FE965A}"/>
+              </a:ext>
+            </a:extLst>
+          </p:cNvPr>
+          <p:cNvCxnSpPr>
+            <a:cxnSpLocks/>
+          </p:cNvCxnSpPr>
+          <p:nvPr/>
+        </p:nvCxnSpPr>
+        <p:spPr>
+          <a:xfrm>
+            <a:off x="76201" y="6473312"/>
+            <a:ext cx="1294359" cy="0"/>
+          </a:xfrm>
+          <a:prstGeom prst="straightConnector1">
+            <a:avLst/>
+          </a:prstGeom>
+          <a:ln w="19050">
+            <a:solidFill>
+              <a:srgbClr val="0070C0"/>
+            </a:solidFill>
+            <a:prstDash val="sysDash"/>
+            <a:headEnd type="arrow" w="med" len="med"/>
+            <a:tailEnd type="none" w="med" len="med"/>
+          </a:ln>
+        </p:spPr>
+        <p:style>
+          <a:lnRef idx="1">
+            <a:schemeClr val="accent1"/>
+          </a:lnRef>
+          <a:fillRef idx="0">
+            <a:schemeClr val="accent1"/>
+          </a:fillRef>
+          <a:effectRef idx="0">
+            <a:schemeClr val="accent1"/>
+          </a:effectRef>
+          <a:fontRef idx="minor">
+            <a:schemeClr val="tx1"/>
+          </a:fontRef>
+        </p:style>
+      </p:cxnSp>
+      <p:sp>
+        <p:nvSpPr>
+          <p:cNvPr id="98" name="TextBox 97">
+            <a:extLst>
+              <a:ext uri="{FF2B5EF4-FFF2-40B4-BE49-F238E27FC236}">
+                <a16:creationId xmlns:a16="http://schemas.microsoft.com/office/drawing/2014/main" id="{3AB635FE-05E9-4471-BD78-82A6584887F1}"/>
+              </a:ext>
+            </a:extLst>
+          </p:cNvPr>
+          <p:cNvSpPr txBox="1"/>
+          <p:nvPr/>
+        </p:nvSpPr>
+        <p:spPr>
+          <a:xfrm>
+            <a:off x="5336560" y="6457654"/>
+            <a:ext cx="258404" cy="261610"/>
+          </a:xfrm>
+          <a:prstGeom prst="rect">
+            <a:avLst/>
+          </a:prstGeom>
+          <a:noFill/>
+        </p:spPr>
+        <p:txBody>
+          <a:bodyPr wrap="none" rtlCol="0">
+            <a:spAutoFit/>
+          </a:bodyPr>
+          <a:lstStyle/>
+          <a:p>
+            <a:r>
+              <a:rPr lang="en-SG" sz="1100" dirty="0">
+                <a:solidFill>
+                  <a:srgbClr val="002060"/>
+                </a:solidFill>
+              </a:rPr>
+              <a:t>X</a:t>
             </a:r>
           </a:p>
         </p:txBody>

</xml_diff>